<commit_message>
+ intro.pptx & edit loss_metric_hpamopt.pptx
</commit_message>
<xml_diff>
--- a/loss_metric_hpamopt.pptx
+++ b/loss_metric_hpamopt.pptx
@@ -232,7 +232,7 @@
             <a:pPr rtl="0"/>
             <a:fld id="{5F30FA10-AEA9-4D1C-AF33-C0237F9F07F4}" type="datetime1">
               <a:rPr lang="it-IT" smtClean="0"/>
-              <a:t>11/06/20</a:t>
+              <a:t>16/06/20</a:t>
             </a:fld>
             <a:endParaRPr lang="it-IT" dirty="0"/>
           </a:p>
@@ -413,7 +413,7 @@
             <a:fld id="{225EE685-0D30-4989-BD11-54BCFF470A35}" type="datetime1">
               <a:rPr lang="it-IT" smtClean="0"/>
               <a:pPr/>
-              <a:t>11/06/20</a:t>
+              <a:t>16/06/20</a:t>
             </a:fld>
             <a:endParaRPr lang="it-IT" dirty="0"/>
           </a:p>
@@ -2031,7 +2031,199 @@
           <a:bodyPr/>
           <a:lstStyle/>
           <a:p>
-            <a:endParaRPr lang="it-IT"/>
+            <a:r>
+              <a:rPr lang="it-IT" dirty="0"/>
+              <a:t>Considerata una semimetrica dato che non soddisfa la disuguaglianza triangolare</a:t>
+            </a:r>
+          </a:p>
+          <a:p>
+            <a:r>
+              <a:rPr lang="it-IT" dirty="0"/>
+              <a:t>Legame con IoU: IoU = </a:t>
+            </a:r>
+            <a:r>
+              <a:rPr lang="it-IT" dirty="0" err="1"/>
+              <a:t>S</a:t>
+            </a:r>
+            <a:r>
+              <a:rPr lang="it-IT" dirty="0"/>
+              <a:t>/(2-S) dove </a:t>
+            </a:r>
+            <a:r>
+              <a:rPr lang="it-IT" dirty="0" err="1"/>
+              <a:t>S</a:t>
+            </a:r>
+            <a:r>
+              <a:rPr lang="it-IT" dirty="0"/>
+              <a:t> = dice </a:t>
+            </a:r>
+            <a:r>
+              <a:rPr lang="it-IT" dirty="0" err="1"/>
+              <a:t>coeff</a:t>
+            </a:r>
+            <a:endParaRPr lang="it-IT" dirty="0"/>
+          </a:p>
+          <a:p>
+            <a:r>
+              <a:rPr lang="it-IT" dirty="0"/>
+              <a:t>Legame tra dice e F1 score =&gt; dice = f1 </a:t>
+            </a:r>
+          </a:p>
+          <a:p>
+            <a:r>
+              <a:rPr lang="it-IT" sz="1200" b="0" i="0" kern="1200" dirty="0">
+                <a:solidFill>
+                  <a:schemeClr val="tx1"/>
+                </a:solidFill>
+                <a:effectLst/>
+                <a:latin typeface="+mn-lt"/>
+                <a:ea typeface="+mn-ea"/>
+                <a:cs typeface="+mn-cs"/>
+              </a:rPr>
+              <a:t>(</a:t>
+            </a:r>
+            <a:r>
+              <a:rPr lang="it-IT" sz="1200" b="1" i="0" kern="1200" dirty="0">
+                <a:solidFill>
+                  <a:schemeClr val="tx1"/>
+                </a:solidFill>
+                <a:effectLst/>
+                <a:latin typeface="+mn-lt"/>
+                <a:ea typeface="+mn-ea"/>
+                <a:cs typeface="+mn-cs"/>
+              </a:rPr>
+              <a:t>F</a:t>
+            </a:r>
+            <a:r>
+              <a:rPr lang="it-IT" sz="1200" b="1" i="0" kern="1200" baseline="-25000" dirty="0">
+                <a:solidFill>
+                  <a:schemeClr val="tx1"/>
+                </a:solidFill>
+                <a:effectLst/>
+                <a:latin typeface="+mn-lt"/>
+                <a:ea typeface="+mn-ea"/>
+                <a:cs typeface="+mn-cs"/>
+              </a:rPr>
+              <a:t>1</a:t>
+            </a:r>
+            <a:r>
+              <a:rPr lang="it-IT" sz="1200" b="1" i="0" kern="1200" dirty="0">
+                <a:solidFill>
+                  <a:schemeClr val="tx1"/>
+                </a:solidFill>
+                <a:effectLst/>
+                <a:latin typeface="+mn-lt"/>
+                <a:ea typeface="+mn-ea"/>
+                <a:cs typeface="+mn-cs"/>
+              </a:rPr>
+              <a:t> score</a:t>
+            </a:r>
+            <a:r>
+              <a:rPr lang="it-IT" sz="1200" b="0" i="0" kern="1200" dirty="0">
+                <a:solidFill>
+                  <a:schemeClr val="tx1"/>
+                </a:solidFill>
+                <a:effectLst/>
+                <a:latin typeface="+mn-lt"/>
+                <a:ea typeface="+mn-ea"/>
+                <a:cs typeface="+mn-cs"/>
+              </a:rPr>
+              <a:t>) is the </a:t>
+            </a:r>
+            <a:r>
+              <a:rPr lang="it-IT" sz="1200" b="0" i="0" u="none" strike="noStrike" kern="1200" dirty="0">
+                <a:solidFill>
+                  <a:schemeClr val="tx1"/>
+                </a:solidFill>
+                <a:effectLst/>
+                <a:latin typeface="+mn-lt"/>
+                <a:ea typeface="+mn-ea"/>
+                <a:cs typeface="+mn-cs"/>
+                <a:hlinkClick r:id="rId3" tooltip="Harmonic mean"/>
+              </a:rPr>
+              <a:t>harmonic mean</a:t>
+            </a:r>
+            <a:r>
+              <a:rPr lang="it-IT" sz="1200" b="0" i="0" kern="1200" dirty="0">
+                <a:solidFill>
+                  <a:schemeClr val="tx1"/>
+                </a:solidFill>
+                <a:effectLst/>
+                <a:latin typeface="+mn-lt"/>
+                <a:ea typeface="+mn-ea"/>
+                <a:cs typeface="+mn-cs"/>
+              </a:rPr>
+              <a:t> of precision and recall:</a:t>
+            </a:r>
+          </a:p>
+          <a:p>
+            <a:r>
+              <a:rPr lang="it-IT" sz="1200" b="0" i="0" kern="1200" dirty="0">
+                <a:solidFill>
+                  <a:schemeClr val="tx1"/>
+                </a:solidFill>
+                <a:effectLst/>
+                <a:latin typeface="+mn-lt"/>
+                <a:ea typeface="+mn-ea"/>
+                <a:cs typeface="+mn-cs"/>
+              </a:rPr>
+              <a:t>2* precision * recall/(precision+recall) [focalizzata su true positive e false negative]</a:t>
+            </a:r>
+          </a:p>
+          <a:p>
+            <a:r>
+              <a:rPr lang="it-IT" sz="1200" b="0" i="0" kern="1200" dirty="0">
+                <a:solidFill>
+                  <a:schemeClr val="tx1"/>
+                </a:solidFill>
+                <a:effectLst/>
+                <a:latin typeface="+mn-lt"/>
+                <a:ea typeface="+mn-ea"/>
+                <a:cs typeface="+mn-cs"/>
+              </a:rPr>
+              <a:t>Precisione = true P / false P + true P</a:t>
+            </a:r>
+          </a:p>
+          <a:p>
+            <a:r>
+              <a:rPr lang="it-IT" sz="1200" b="0" i="0" kern="1200" dirty="0">
+                <a:solidFill>
+                  <a:schemeClr val="tx1"/>
+                </a:solidFill>
+                <a:effectLst/>
+                <a:latin typeface="+mn-lt"/>
+                <a:ea typeface="+mn-ea"/>
+                <a:cs typeface="+mn-cs"/>
+              </a:rPr>
+              <a:t>Recall = true P / false </a:t>
+            </a:r>
+            <a:r>
+              <a:rPr lang="it-IT" sz="1200" b="0" i="0" kern="1200" dirty="0" err="1">
+                <a:solidFill>
+                  <a:schemeClr val="tx1"/>
+                </a:solidFill>
+                <a:effectLst/>
+                <a:latin typeface="+mn-lt"/>
+                <a:ea typeface="+mn-ea"/>
+                <a:cs typeface="+mn-cs"/>
+              </a:rPr>
+              <a:t>N</a:t>
+            </a:r>
+            <a:r>
+              <a:rPr lang="it-IT" sz="1200" b="0" i="0" kern="1200" dirty="0">
+                <a:solidFill>
+                  <a:schemeClr val="tx1"/>
+                </a:solidFill>
+                <a:effectLst/>
+                <a:latin typeface="+mn-lt"/>
+                <a:ea typeface="+mn-ea"/>
+                <a:cs typeface="+mn-cs"/>
+              </a:rPr>
+              <a:t> + true P</a:t>
+            </a:r>
+          </a:p>
+          <a:p>
+            <a:endParaRPr lang="it-IT" dirty="0"/>
           </a:p>
         </p:txBody>
       </p:sp>
@@ -2260,7 +2452,7 @@
             <a:pPr rtl="0"/>
             <a:fld id="{5A76580B-5FC5-4470-B8CF-7EB295DF8E52}" type="datetime1">
               <a:rPr lang="it-IT" noProof="0" smtClean="0"/>
-              <a:t>11/06/20</a:t>
+              <a:t>16/06/20</a:t>
             </a:fld>
             <a:endParaRPr lang="it-IT" noProof="0"/>
           </a:p>
@@ -2591,7 +2783,7 @@
             <a:pPr rtl="0"/>
             <a:fld id="{FDF4EC6C-F820-43BF-B855-B2BC3AF939B3}" type="datetime1">
               <a:rPr lang="it-IT" noProof="0" smtClean="0"/>
-              <a:t>11/06/20</a:t>
+              <a:t>16/06/20</a:t>
             </a:fld>
             <a:endParaRPr lang="it-IT" noProof="0"/>
           </a:p>
@@ -2756,7 +2948,7 @@
             <a:pPr rtl="0"/>
             <a:fld id="{1CF9B8EF-41FF-40C4-B0E7-284FEA4509CF}" type="datetime1">
               <a:rPr lang="it-IT" noProof="0" smtClean="0"/>
-              <a:t>11/06/20</a:t>
+              <a:t>16/06/20</a:t>
             </a:fld>
             <a:endParaRPr lang="it-IT" noProof="0"/>
           </a:p>
@@ -2887,7 +3079,7 @@
             <a:pPr rtl="0"/>
             <a:fld id="{7EDF7881-F571-4D46-9E7A-2FB7CA954ABE}" type="datetime1">
               <a:rPr lang="it-IT" noProof="0" smtClean="0"/>
-              <a:t>11/06/20</a:t>
+              <a:t>16/06/20</a:t>
             </a:fld>
             <a:endParaRPr lang="it-IT" noProof="0"/>
           </a:p>
@@ -3211,7 +3403,7 @@
             <a:pPr rtl="0"/>
             <a:fld id="{69FAB7D8-6E55-4BD4-AD3A-A60BF7DD655E}" type="datetime1">
               <a:rPr lang="it-IT" noProof="0" smtClean="0"/>
-              <a:t>11/06/20</a:t>
+              <a:t>16/06/20</a:t>
             </a:fld>
             <a:endParaRPr lang="it-IT" noProof="0"/>
           </a:p>
@@ -3511,7 +3703,7 @@
             <a:pPr rtl="0"/>
             <a:fld id="{75AE3B51-0931-4014-B82F-6A662BDBCD2F}" type="datetime1">
               <a:rPr lang="it-IT" noProof="0" smtClean="0"/>
-              <a:t>11/06/20</a:t>
+              <a:t>16/06/20</a:t>
             </a:fld>
             <a:endParaRPr lang="it-IT" noProof="0"/>
           </a:p>
@@ -3749,7 +3941,7 @@
             <a:pPr rtl="0"/>
             <a:fld id="{E4566A5B-F7EE-42CE-8779-B69FF7195412}" type="datetime1">
               <a:rPr lang="it-IT" noProof="0" smtClean="0"/>
-              <a:t>11/06/20</a:t>
+              <a:t>16/06/20</a:t>
             </a:fld>
             <a:endParaRPr lang="it-IT" noProof="0"/>
           </a:p>
@@ -4434,7 +4626,7 @@
             <a:pPr rtl="0"/>
             <a:fld id="{7A3BF4EC-E609-4A79-B934-9C8854EC47AE}" type="datetime1">
               <a:rPr lang="it-IT" noProof="0" smtClean="0"/>
-              <a:t>11/06/20</a:t>
+              <a:t>16/06/20</a:t>
             </a:fld>
             <a:endParaRPr lang="it-IT" noProof="0"/>
           </a:p>
@@ -4759,7 +4951,7 @@
             <a:pPr rtl="0"/>
             <a:fld id="{5B7E7CE2-3E3D-4742-A57F-96F292E999DC}" type="datetime1">
               <a:rPr lang="it-IT" noProof="0" smtClean="0"/>
-              <a:t>11/06/20</a:t>
+              <a:t>16/06/20</a:t>
             </a:fld>
             <a:endParaRPr lang="it-IT" noProof="0"/>
           </a:p>
@@ -5391,7 +5583,7 @@
             <a:pPr rtl="0"/>
             <a:fld id="{DA5D075F-B65D-4A54-A326-C89999652CFC}" type="datetime1">
               <a:rPr lang="it-IT" noProof="0" smtClean="0"/>
-              <a:t>11/06/20</a:t>
+              <a:t>16/06/20</a:t>
             </a:fld>
             <a:endParaRPr lang="it-IT" noProof="0"/>
           </a:p>
@@ -5847,7 +6039,7 @@
             <a:pPr rtl="0"/>
             <a:fld id="{6F08FB15-E1FB-4F23-8911-D2FC1108CCB3}" type="datetime1">
               <a:rPr lang="it-IT" noProof="0" smtClean="0"/>
-              <a:t>11/06/20</a:t>
+              <a:t>16/06/20</a:t>
             </a:fld>
             <a:endParaRPr lang="it-IT" noProof="0"/>
           </a:p>
@@ -6249,7 +6441,7 @@
             <a:pPr rtl="0"/>
             <a:fld id="{446EC898-FFC6-47A0-904A-EFB0B1FE25BB}" type="datetime1">
               <a:rPr lang="it-IT" noProof="0" smtClean="0"/>
-              <a:t>11/06/20</a:t>
+              <a:t>16/06/20</a:t>
             </a:fld>
             <a:endParaRPr lang="it-IT" noProof="0"/>
           </a:p>
@@ -6543,7 +6735,7 @@
             <a:pPr rtl="0"/>
             <a:fld id="{130CD048-5678-4F30-8046-CE59477BB3C0}" type="datetime1">
               <a:rPr lang="it-IT" noProof="0" smtClean="0"/>
-              <a:t>11/06/20</a:t>
+              <a:t>16/06/20</a:t>
             </a:fld>
             <a:endParaRPr lang="it-IT" noProof="0"/>
           </a:p>
@@ -7593,8 +7785,8 @@
           </a:prstGeom>
         </p:spPr>
       </p:pic>
-      <mc:AlternateContent xmlns:mc="http://schemas.openxmlformats.org/markup-compatibility/2006">
-        <mc:Choice xmlns:a14="http://schemas.microsoft.com/office/drawing/2010/main" Requires="a14">
+      <mc:AlternateContent xmlns:mc="http://schemas.openxmlformats.org/markup-compatibility/2006" xmlns:a14="http://schemas.microsoft.com/office/drawing/2010/main">
+        <mc:Choice Requires="a14">
           <p:sp>
             <p:nvSpPr>
               <p:cNvPr id="3" name="Segnaposto contenuto 2">
@@ -7651,7 +7843,7 @@
             </p:txBody>
           </p:sp>
         </mc:Choice>
-        <mc:Fallback>
+        <mc:Fallback xmlns="">
           <p:sp>
             <p:nvSpPr>
               <p:cNvPr id="3" name="Segnaposto contenuto 2">
@@ -7775,7 +7967,7 @@
             <a:pPr rtl="0"/>
             <a:r>
               <a:rPr lang="it-IT" dirty="0"/>
-              <a:t>Intersect over union</a:t>
+              <a:t>IntersectION over union</a:t>
             </a:r>
           </a:p>
         </p:txBody>
@@ -8546,20 +8738,8 @@
           <a:p>
             <a:pPr rtl="0"/>
             <a:r>
-              <a:rPr lang="it-IT" dirty="0" err="1"/>
-              <a:t>What’s</a:t>
-            </a:r>
-            <a:r>
               <a:rPr lang="it-IT" dirty="0"/>
-              <a:t> </a:t>
-            </a:r>
-            <a:r>
-              <a:rPr lang="it-IT" dirty="0" err="1"/>
-              <a:t>next</a:t>
-            </a:r>
-            <a:r>
-              <a:rPr lang="it-IT" dirty="0"/>
-              <a:t>?</a:t>
+              <a:t>What’s next?</a:t>
             </a:r>
           </a:p>
         </p:txBody>
@@ -9500,8 +9680,8 @@
           </a:prstGeom>
         </p:spPr>
       </p:pic>
-      <mc:AlternateContent xmlns:mc="http://schemas.openxmlformats.org/markup-compatibility/2006">
-        <mc:Choice xmlns:a14="http://schemas.microsoft.com/office/drawing/2010/main" Requires="a14">
+      <mc:AlternateContent xmlns:mc="http://schemas.openxmlformats.org/markup-compatibility/2006" xmlns:a14="http://schemas.microsoft.com/office/drawing/2010/main">
+        <mc:Choice Requires="a14">
           <p:sp>
             <p:nvSpPr>
               <p:cNvPr id="3" name="Segnaposto contenuto 2">
@@ -9661,7 +9841,7 @@
             </p:txBody>
           </p:sp>
         </mc:Choice>
-        <mc:Fallback>
+        <mc:Fallback xmlns="">
           <p:sp>
             <p:nvSpPr>
               <p:cNvPr id="3" name="Segnaposto contenuto 2">
@@ -9701,8 +9881,8 @@
           </p:sp>
         </mc:Fallback>
       </mc:AlternateContent>
-      <mc:AlternateContent xmlns:mc="http://schemas.openxmlformats.org/markup-compatibility/2006">
-        <mc:Choice xmlns:a14="http://schemas.microsoft.com/office/drawing/2010/main" Requires="a14">
+      <mc:AlternateContent xmlns:mc="http://schemas.openxmlformats.org/markup-compatibility/2006" xmlns:a14="http://schemas.microsoft.com/office/drawing/2010/main">
+        <mc:Choice Requires="a14">
           <p:sp>
             <p:nvSpPr>
               <p:cNvPr id="4" name="Segnaposto contenuto 3">
@@ -10008,7 +10188,7 @@
             </p:txBody>
           </p:sp>
         </mc:Choice>
-        <mc:Fallback>
+        <mc:Fallback xmlns="">
           <p:sp>
             <p:nvSpPr>
               <p:cNvPr id="4" name="Segnaposto contenuto 3">
@@ -10385,7 +10565,7 @@
             <a:pPr rtl="0"/>
             <a:r>
               <a:rPr lang="it-IT" dirty="0"/>
-              <a:t>Ulteriori alternative</a:t>
+              <a:t>alternative</a:t>
             </a:r>
           </a:p>
         </p:txBody>
@@ -10423,35 +10603,184 @@
           </a:prstGeom>
         </p:spPr>
       </p:pic>
-      <p:sp>
-        <p:nvSpPr>
-          <p:cNvPr id="3" name="Segnaposto contenuto 2">
-            <a:extLst>
-              <a:ext uri="{FF2B5EF4-FFF2-40B4-BE49-F238E27FC236}">
-                <a16:creationId xmlns:a16="http://schemas.microsoft.com/office/drawing/2014/main" id="{90E8A47E-9D4A-4D70-B23A-B0AC3757292F}"/>
-              </a:ext>
-            </a:extLst>
-          </p:cNvPr>
-          <p:cNvSpPr>
-            <a:spLocks noGrp="1"/>
-          </p:cNvSpPr>
-          <p:nvPr>
-            <p:ph idx="1"/>
-          </p:nvPr>
-        </p:nvSpPr>
-        <p:spPr/>
-        <p:txBody>
-          <a:bodyPr rtlCol="0"/>
-          <a:lstStyle/>
-          <a:p>
-            <a:pPr rtl="0"/>
-            <a:r>
-              <a:rPr lang="it-IT" dirty="0"/>
-              <a:t>DICE loss: scrivi qualcosa</a:t>
-            </a:r>
-          </a:p>
-        </p:txBody>
-      </p:sp>
+      <mc:AlternateContent xmlns:mc="http://schemas.openxmlformats.org/markup-compatibility/2006">
+        <mc:Choice xmlns:a14="http://schemas.microsoft.com/office/drawing/2010/main" Requires="a14">
+          <p:sp>
+            <p:nvSpPr>
+              <p:cNvPr id="3" name="Segnaposto contenuto 2">
+                <a:extLst>
+                  <a:ext uri="{FF2B5EF4-FFF2-40B4-BE49-F238E27FC236}">
+                    <a16:creationId xmlns:a16="http://schemas.microsoft.com/office/drawing/2014/main" id="{90E8A47E-9D4A-4D70-B23A-B0AC3757292F}"/>
+                  </a:ext>
+                </a:extLst>
+              </p:cNvPr>
+              <p:cNvSpPr>
+                <a:spLocks noGrp="1"/>
+              </p:cNvSpPr>
+              <p:nvPr>
+                <p:ph idx="1"/>
+              </p:nvPr>
+            </p:nvSpPr>
+            <p:spPr/>
+            <p:txBody>
+              <a:bodyPr rtlCol="0"/>
+              <a:lstStyle/>
+              <a:p>
+                <a:pPr rtl="0"/>
+                <a:r>
+                  <a:rPr lang="it-IT" dirty="0"/>
+                  <a:t>Altra popolare loss/metrica è la DICE: </a:t>
+                </a:r>
+                <a14:m>
+                  <m:oMath xmlns:m="http://schemas.openxmlformats.org/officeDocument/2006/math">
+                    <m:f>
+                      <m:fPr>
+                        <m:ctrlPr>
+                          <a:rPr lang="it-IT" i="1" smtClean="0">
+                            <a:latin typeface="Cambria Math" panose="02040503050406030204" pitchFamily="18" charset="0"/>
+                          </a:rPr>
+                        </m:ctrlPr>
+                      </m:fPr>
+                      <m:num>
+                        <m:r>
+                          <a:rPr lang="it-IT" b="0" i="1" smtClean="0">
+                            <a:latin typeface="Cambria Math" panose="02040503050406030204" pitchFamily="18" charset="0"/>
+                          </a:rPr>
+                          <m:t>2 |</m:t>
+                        </m:r>
+                        <m:r>
+                          <a:rPr lang="it-IT" b="0" i="1" smtClean="0">
+                            <a:latin typeface="Cambria Math" panose="02040503050406030204" pitchFamily="18" charset="0"/>
+                          </a:rPr>
+                          <m:t>𝐴</m:t>
+                        </m:r>
+                        <m:r>
+                          <a:rPr lang="it-IT" b="0" i="1" smtClean="0">
+                            <a:latin typeface="Cambria Math" panose="02040503050406030204" pitchFamily="18" charset="0"/>
+                            <a:ea typeface="Cambria Math" panose="02040503050406030204" pitchFamily="18" charset="0"/>
+                          </a:rPr>
+                          <m:t>∩</m:t>
+                        </m:r>
+                        <m:r>
+                          <a:rPr lang="it-IT" b="0" i="1" smtClean="0">
+                            <a:latin typeface="Cambria Math" panose="02040503050406030204" pitchFamily="18" charset="0"/>
+                            <a:ea typeface="Cambria Math" panose="02040503050406030204" pitchFamily="18" charset="0"/>
+                          </a:rPr>
+                          <m:t>𝐵</m:t>
+                        </m:r>
+                        <m:r>
+                          <a:rPr lang="it-IT" b="0" i="1" smtClean="0">
+                            <a:latin typeface="Cambria Math" panose="02040503050406030204" pitchFamily="18" charset="0"/>
+                          </a:rPr>
+                          <m:t>|</m:t>
+                        </m:r>
+                      </m:num>
+                      <m:den>
+                        <m:d>
+                          <m:dPr>
+                            <m:begChr m:val="|"/>
+                            <m:endChr m:val="|"/>
+                            <m:ctrlPr>
+                              <a:rPr lang="it-IT" b="0" i="1" smtClean="0">
+                                <a:latin typeface="Cambria Math" panose="02040503050406030204" pitchFamily="18" charset="0"/>
+                              </a:rPr>
+                            </m:ctrlPr>
+                          </m:dPr>
+                          <m:e>
+                            <m:r>
+                              <a:rPr lang="it-IT" b="0" i="1" smtClean="0">
+                                <a:latin typeface="Cambria Math" panose="02040503050406030204" pitchFamily="18" charset="0"/>
+                              </a:rPr>
+                              <m:t>𝐴</m:t>
+                            </m:r>
+                          </m:e>
+                        </m:d>
+                        <m:r>
+                          <a:rPr lang="it-IT" b="0" i="1" smtClean="0">
+                            <a:latin typeface="Cambria Math" panose="02040503050406030204" pitchFamily="18" charset="0"/>
+                          </a:rPr>
+                          <m:t>+|</m:t>
+                        </m:r>
+                        <m:r>
+                          <a:rPr lang="it-IT" b="0" i="1" smtClean="0">
+                            <a:latin typeface="Cambria Math" panose="02040503050406030204" pitchFamily="18" charset="0"/>
+                          </a:rPr>
+                          <m:t>𝐵</m:t>
+                        </m:r>
+                        <m:r>
+                          <a:rPr lang="it-IT" b="0" i="1" smtClean="0">
+                            <a:latin typeface="Cambria Math" panose="02040503050406030204" pitchFamily="18" charset="0"/>
+                          </a:rPr>
+                          <m:t>|</m:t>
+                        </m:r>
+                      </m:den>
+                    </m:f>
+                  </m:oMath>
+                </a14:m>
+                <a:r>
+                  <a:rPr lang="it-IT" dirty="0"/>
+                  <a:t> ;</a:t>
+                </a:r>
+              </a:p>
+              <a:p>
+                <a:pPr rtl="0"/>
+                <a:r>
+                  <a:rPr lang="it-IT" dirty="0"/>
+                  <a:t>Empiricamente la Jaccard Loss  ci ha restituito risultati migliori!</a:t>
+                </a:r>
+              </a:p>
+              <a:p>
+                <a:pPr marL="0" indent="0" rtl="0">
+                  <a:buNone/>
+                </a:pPr>
+                <a:r>
+                  <a:rPr lang="it-IT" dirty="0"/>
+                  <a:t>  </a:t>
+                </a:r>
+              </a:p>
+            </p:txBody>
+          </p:sp>
+        </mc:Choice>
+        <mc:Fallback>
+          <p:sp>
+            <p:nvSpPr>
+              <p:cNvPr id="3" name="Segnaposto contenuto 2">
+                <a:extLst>
+                  <a:ext uri="{FF2B5EF4-FFF2-40B4-BE49-F238E27FC236}">
+                    <a16:creationId xmlns:a16="http://schemas.microsoft.com/office/drawing/2014/main" id="{90E8A47E-9D4A-4D70-B23A-B0AC3757292F}"/>
+                  </a:ext>
+                </a:extLst>
+              </p:cNvPr>
+              <p:cNvSpPr>
+                <a:spLocks noGrp="1" noRot="1" noChangeAspect="1" noMove="1" noResize="1" noEditPoints="1" noAdjustHandles="1" noChangeArrowheads="1" noChangeShapeType="1" noTextEdit="1"/>
+              </p:cNvSpPr>
+              <p:nvPr>
+                <p:ph idx="1"/>
+              </p:nvPr>
+            </p:nvSpPr>
+            <p:spPr>
+              <a:blipFill>
+                <a:blip r:embed="rId4"/>
+                <a:stretch>
+                  <a:fillRect l="-351"/>
+                </a:stretch>
+              </a:blipFill>
+            </p:spPr>
+            <p:txBody>
+              <a:bodyPr/>
+              <a:lstStyle/>
+              <a:p>
+                <a:r>
+                  <a:rPr lang="it-IT">
+                    <a:noFill/>
+                  </a:rPr>
+                  <a:t> </a:t>
+                </a:r>
+              </a:p>
+            </p:txBody>
+          </p:sp>
+        </mc:Fallback>
+      </mc:AlternateContent>
     </p:spTree>
     <p:extLst>
       <p:ext uri="{BB962C8B-B14F-4D97-AF65-F5344CB8AC3E}">
@@ -11275,6 +11604,15 @@
 </file>
 
 <file path=customXml/item1.xml><?xml version="1.0" encoding="utf-8"?>
+<p:properties xmlns:p="http://schemas.microsoft.com/office/2006/metadata/properties" xmlns:xsi="http://www.w3.org/2001/XMLSchema-instance" xmlns:pc="http://schemas.microsoft.com/office/infopath/2007/PartnerControls">
+  <documentManagement>
+    <_ip_UnifiedCompliancePolicyUIAction xmlns="http://schemas.microsoft.com/sharepoint/v3" xsi:nil="true"/>
+    <_ip_UnifiedCompliancePolicyProperties xmlns="http://schemas.microsoft.com/sharepoint/v3" xsi:nil="true"/>
+  </documentManagement>
+</p:properties>
+</file>
+
+<file path=customXml/item2.xml><?xml version="1.0" encoding="utf-8"?>
 <ct:contentTypeSchema xmlns:ct="http://schemas.microsoft.com/office/2006/metadata/contentType" xmlns:ma="http://schemas.microsoft.com/office/2006/metadata/properties/metaAttributes" ct:_="" ma:_="" ma:contentTypeName="Document" ma:contentTypeID="0x010100DEEA25CC0A0AC24199CDC46C25B8B0BC" ma:contentTypeVersion="10" ma:contentTypeDescription="Create a new document." ma:contentTypeScope="" ma:versionID="e3b47856d4cf355c0dacb39e1084d14f">
   <xsd:schema xmlns:xsd="http://www.w3.org/2001/XMLSchema" xmlns:xs="http://www.w3.org/2001/XMLSchema" xmlns:p="http://schemas.microsoft.com/office/2006/metadata/properties" xmlns:ns1="http://schemas.microsoft.com/sharepoint/v3" xmlns:ns2="6dc4bcd6-49db-4c07-9060-8acfc67cef9f" xmlns:ns3="fb0879af-3eba-417a-a55a-ffe6dcd6ca77" targetNamespace="http://schemas.microsoft.com/office/2006/metadata/properties" ma:root="true" ma:fieldsID="a845a615265fdb1f7b12cc65ac20ecbd" ns1:_="" ns2:_="" ns3:_="">
     <xsd:import namespace="http://schemas.microsoft.com/sharepoint/v3"/>
@@ -11482,7 +11820,7 @@
 </ct:contentTypeSchema>
 </file>
 
-<file path=customXml/item2.xml><?xml version="1.0" encoding="utf-8"?>
+<file path=customXml/item3.xml><?xml version="1.0" encoding="utf-8"?>
 <?mso-contentType ?>
 <FormTemplates xmlns="http://schemas.microsoft.com/sharepoint/v3/contenttype/forms">
   <Display>DocumentLibraryForm</Display>
@@ -11491,16 +11829,17 @@
 </FormTemplates>
 </file>
 
-<file path=customXml/item3.xml><?xml version="1.0" encoding="utf-8"?>
-<p:properties xmlns:p="http://schemas.microsoft.com/office/2006/metadata/properties" xmlns:xsi="http://www.w3.org/2001/XMLSchema-instance" xmlns:pc="http://schemas.microsoft.com/office/infopath/2007/PartnerControls">
-  <documentManagement>
-    <_ip_UnifiedCompliancePolicyUIAction xmlns="http://schemas.microsoft.com/sharepoint/v3" xsi:nil="true"/>
-    <_ip_UnifiedCompliancePolicyProperties xmlns="http://schemas.microsoft.com/sharepoint/v3" xsi:nil="true"/>
-  </documentManagement>
-</p:properties>
+<file path=customXml/itemProps1.xml><?xml version="1.0" encoding="utf-8"?>
+<ds:datastoreItem xmlns:ds="http://schemas.openxmlformats.org/officeDocument/2006/customXml" ds:itemID="{183E21D3-7788-4819-8437-C5C4B0C5D46D}">
+  <ds:schemaRefs>
+    <ds:schemaRef ds:uri="http://schemas.microsoft.com/office/2006/metadata/properties"/>
+    <ds:schemaRef ds:uri="http://schemas.microsoft.com/office/infopath/2007/PartnerControls"/>
+    <ds:schemaRef ds:uri="http://schemas.microsoft.com/sharepoint/v3"/>
+  </ds:schemaRefs>
+</ds:datastoreItem>
 </file>
 
-<file path=customXml/itemProps1.xml><?xml version="1.0" encoding="utf-8"?>
+<file path=customXml/itemProps2.xml><?xml version="1.0" encoding="utf-8"?>
 <ds:datastoreItem xmlns:ds="http://schemas.openxmlformats.org/officeDocument/2006/customXml" ds:itemID="{063CD11F-9FDB-4628-B708-63BFB2D681DF}">
   <ds:schemaRefs>
     <ds:schemaRef ds:uri="http://schemas.microsoft.com/office/2006/metadata/contentType"/>
@@ -11520,20 +11859,10 @@
 </ds:datastoreItem>
 </file>
 
-<file path=customXml/itemProps2.xml><?xml version="1.0" encoding="utf-8"?>
+<file path=customXml/itemProps3.xml><?xml version="1.0" encoding="utf-8"?>
 <ds:datastoreItem xmlns:ds="http://schemas.openxmlformats.org/officeDocument/2006/customXml" ds:itemID="{3EBF972C-B81A-46A3-BFB2-A01F0B5DBC70}">
   <ds:schemaRefs>
     <ds:schemaRef ds:uri="http://schemas.microsoft.com/sharepoint/v3/contenttype/forms"/>
   </ds:schemaRefs>
 </ds:datastoreItem>
-</file>
-
-<file path=customXml/itemProps3.xml><?xml version="1.0" encoding="utf-8"?>
-<ds:datastoreItem xmlns:ds="http://schemas.openxmlformats.org/officeDocument/2006/customXml" ds:itemID="{183E21D3-7788-4819-8437-C5C4B0C5D46D}">
-  <ds:schemaRefs>
-    <ds:schemaRef ds:uri="http://schemas.microsoft.com/office/2006/metadata/properties"/>
-    <ds:schemaRef ds:uri="http://schemas.microsoft.com/office/infopath/2007/PartnerControls"/>
-    <ds:schemaRef ds:uri="http://schemas.microsoft.com/sharepoint/v3"/>
-  </ds:schemaRefs>
-</ds:datastoreItem>
 </file>
</xml_diff>